<commit_message>
diagrams/modeling/SD/basic: update answer to PersonEtc
</commit_message>
<xml_diff>
--- a/diagrams/modelling/modellingBehaviours/sequenceDiagramsBasic/PersonEtc.pptx
+++ b/diagrams/modelling/modellingBehaviours/sequenceDiagramsBasic/PersonEtc.pptx
@@ -304,7 +304,7 @@
           <a:p>
             <a:fld id="{5C63EA63-0159-4067-AC1E-0A923D89E69F}" type="datetimeFigureOut">
               <a:rPr lang="en-SG" smtClean="0"/>
-              <a:t>17/9/2018</a:t>
+              <a:t>23/10/2018</a:t>
             </a:fld>
             <a:endParaRPr lang="en-SG"/>
           </a:p>
@@ -474,7 +474,7 @@
           <a:p>
             <a:fld id="{5C63EA63-0159-4067-AC1E-0A923D89E69F}" type="datetimeFigureOut">
               <a:rPr lang="en-SG" smtClean="0"/>
-              <a:t>17/9/2018</a:t>
+              <a:t>23/10/2018</a:t>
             </a:fld>
             <a:endParaRPr lang="en-SG"/>
           </a:p>
@@ -654,7 +654,7 @@
           <a:p>
             <a:fld id="{5C63EA63-0159-4067-AC1E-0A923D89E69F}" type="datetimeFigureOut">
               <a:rPr lang="en-SG" smtClean="0"/>
-              <a:t>17/9/2018</a:t>
+              <a:t>23/10/2018</a:t>
             </a:fld>
             <a:endParaRPr lang="en-SG"/>
           </a:p>
@@ -824,7 +824,7 @@
           <a:p>
             <a:fld id="{5C63EA63-0159-4067-AC1E-0A923D89E69F}" type="datetimeFigureOut">
               <a:rPr lang="en-SG" smtClean="0"/>
-              <a:t>17/9/2018</a:t>
+              <a:t>23/10/2018</a:t>
             </a:fld>
             <a:endParaRPr lang="en-SG"/>
           </a:p>
@@ -1070,7 +1070,7 @@
           <a:p>
             <a:fld id="{5C63EA63-0159-4067-AC1E-0A923D89E69F}" type="datetimeFigureOut">
               <a:rPr lang="en-SG" smtClean="0"/>
-              <a:t>17/9/2018</a:t>
+              <a:t>23/10/2018</a:t>
             </a:fld>
             <a:endParaRPr lang="en-SG"/>
           </a:p>
@@ -1358,7 +1358,7 @@
           <a:p>
             <a:fld id="{5C63EA63-0159-4067-AC1E-0A923D89E69F}" type="datetimeFigureOut">
               <a:rPr lang="en-SG" smtClean="0"/>
-              <a:t>17/9/2018</a:t>
+              <a:t>23/10/2018</a:t>
             </a:fld>
             <a:endParaRPr lang="en-SG"/>
           </a:p>
@@ -1780,7 +1780,7 @@
           <a:p>
             <a:fld id="{5C63EA63-0159-4067-AC1E-0A923D89E69F}" type="datetimeFigureOut">
               <a:rPr lang="en-SG" smtClean="0"/>
-              <a:t>17/9/2018</a:t>
+              <a:t>23/10/2018</a:t>
             </a:fld>
             <a:endParaRPr lang="en-SG"/>
           </a:p>
@@ -1898,7 +1898,7 @@
           <a:p>
             <a:fld id="{5C63EA63-0159-4067-AC1E-0A923D89E69F}" type="datetimeFigureOut">
               <a:rPr lang="en-SG" smtClean="0"/>
-              <a:t>17/9/2018</a:t>
+              <a:t>23/10/2018</a:t>
             </a:fld>
             <a:endParaRPr lang="en-SG"/>
           </a:p>
@@ -1993,7 +1993,7 @@
           <a:p>
             <a:fld id="{5C63EA63-0159-4067-AC1E-0A923D89E69F}" type="datetimeFigureOut">
               <a:rPr lang="en-SG" smtClean="0"/>
-              <a:t>17/9/2018</a:t>
+              <a:t>23/10/2018</a:t>
             </a:fld>
             <a:endParaRPr lang="en-SG"/>
           </a:p>
@@ -2270,7 +2270,7 @@
           <a:p>
             <a:fld id="{5C63EA63-0159-4067-AC1E-0A923D89E69F}" type="datetimeFigureOut">
               <a:rPr lang="en-SG" smtClean="0"/>
-              <a:t>17/9/2018</a:t>
+              <a:t>23/10/2018</a:t>
             </a:fld>
             <a:endParaRPr lang="en-SG"/>
           </a:p>
@@ -2523,7 +2523,7 @@
           <a:p>
             <a:fld id="{5C63EA63-0159-4067-AC1E-0A923D89E69F}" type="datetimeFigureOut">
               <a:rPr lang="en-SG" smtClean="0"/>
-              <a:t>17/9/2018</a:t>
+              <a:t>23/10/2018</a:t>
             </a:fld>
             <a:endParaRPr lang="en-SG"/>
           </a:p>
@@ -2736,7 +2736,7 @@
           <a:p>
             <a:fld id="{5C63EA63-0159-4067-AC1E-0A923D89E69F}" type="datetimeFigureOut">
               <a:rPr lang="en-SG" smtClean="0"/>
-              <a:t>17/9/2018</a:t>
+              <a:t>23/10/2018</a:t>
             </a:fld>
             <a:endParaRPr lang="en-SG"/>
           </a:p>
@@ -3121,8 +3121,8 @@
         </p:nvSpPr>
         <p:spPr bwMode="auto">
           <a:xfrm>
-            <a:off x="1778369" y="2643594"/>
-            <a:ext cx="6538047" cy="2081550"/>
+            <a:off x="1475657" y="2643594"/>
+            <a:ext cx="6840760" cy="2225566"/>
           </a:xfrm>
           <a:prstGeom prst="rect">
             <a:avLst/>
@@ -3135,7 +3135,7 @@
           </a:solidFill>
           <a:ln w="19050" algn="ctr">
             <a:solidFill>
-              <a:schemeClr val="tx1"/>
+              <a:srgbClr val="0070C0"/>
             </a:solidFill>
             <a:miter lim="800000"/>
             <a:headEnd/>
@@ -3290,19 +3290,20 @@
         <p:spPr bwMode="auto">
           <a:xfrm>
             <a:off x="4369487" y="1944508"/>
-            <a:ext cx="10044" cy="2826209"/>
+            <a:ext cx="0" cy="3049221"/>
           </a:xfrm>
           <a:prstGeom prst="line">
             <a:avLst/>
           </a:prstGeom>
           <a:ln>
             <a:solidFill>
-              <a:schemeClr val="tx1"/>
+              <a:srgbClr val="7030A0"/>
             </a:solidFill>
             <a:prstDash val="sysDash"/>
             <a:headEnd/>
             <a:tailEnd/>
           </a:ln>
+          <a:effectLst/>
         </p:spPr>
         <p:style>
           <a:lnRef idx="2">
@@ -3342,10 +3343,17 @@
           <a:prstGeom prst="rect">
             <a:avLst/>
           </a:prstGeom>
+          <a:solidFill>
+            <a:srgbClr val="7030A0"/>
+          </a:solidFill>
           <a:ln>
+            <a:solidFill>
+              <a:schemeClr val="bg1"/>
+            </a:solidFill>
             <a:headEnd/>
             <a:tailEnd/>
           </a:ln>
+          <a:effectLst/>
         </p:spPr>
         <p:style>
           <a:lnRef idx="1">
@@ -3377,7 +3385,7 @@
             <a:r>
               <a:rPr lang="en-US" sz="2000" dirty="0" smtClean="0">
                 <a:solidFill>
-                  <a:schemeClr val="tx1"/>
+                  <a:schemeClr val="bg1"/>
                 </a:solidFill>
               </a:rPr>
               <a:t>:</a:t>
@@ -3385,14 +3393,14 @@
             <a:r>
               <a:rPr lang="en-US" sz="2000" dirty="0" err="1" smtClean="0">
                 <a:solidFill>
-                  <a:schemeClr val="tx1"/>
+                  <a:schemeClr val="bg1"/>
                 </a:solidFill>
               </a:rPr>
               <a:t>PersonList</a:t>
             </a:r>
             <a:endParaRPr lang="en-US" sz="2000" dirty="0">
               <a:solidFill>
-                <a:schemeClr val="tx1"/>
+                <a:schemeClr val="bg1"/>
               </a:solidFill>
             </a:endParaRPr>
           </a:p>
@@ -3408,8 +3416,8 @@
         </p:nvSpPr>
         <p:spPr bwMode="auto">
           <a:xfrm>
-            <a:off x="1778686" y="1772816"/>
-            <a:ext cx="1807083" cy="0"/>
+            <a:off x="2297786" y="1772816"/>
+            <a:ext cx="1287983" cy="0"/>
           </a:xfrm>
           <a:prstGeom prst="line">
             <a:avLst/>
@@ -3417,7 +3425,7 @@
           <a:noFill/>
           <a:ln w="19050">
             <a:solidFill>
-              <a:schemeClr val="tx1"/>
+              <a:srgbClr val="C00000"/>
             </a:solidFill>
             <a:round/>
             <a:headEnd/>
@@ -3451,7 +3459,7 @@
           <a:noFill/>
           <a:ln w="19050">
             <a:solidFill>
-              <a:schemeClr val="tx1"/>
+              <a:srgbClr val="7030A0"/>
             </a:solidFill>
             <a:prstDash val="sysDash"/>
             <a:round/>
@@ -3530,7 +3538,15 @@
           <a:prstGeom prst="rect">
             <a:avLst/>
           </a:prstGeom>
-          <a:ln/>
+          <a:solidFill>
+            <a:srgbClr val="7030A0"/>
+          </a:solidFill>
+          <a:ln>
+            <a:solidFill>
+              <a:schemeClr val="bg1"/>
+            </a:solidFill>
+          </a:ln>
+          <a:effectLst/>
         </p:spPr>
         <p:style>
           <a:lnRef idx="1">
@@ -3553,7 +3569,7 @@
             <a:pPr algn="ctr"/>
             <a:endParaRPr lang="en-US" sz="2000">
               <a:solidFill>
-                <a:schemeClr val="tx1"/>
+                <a:schemeClr val="bg1"/>
               </a:solidFill>
             </a:endParaRPr>
           </a:p>
@@ -3569,20 +3585,23 @@
         </p:nvSpPr>
         <p:spPr bwMode="auto">
           <a:xfrm>
-            <a:off x="6637036" y="3223028"/>
-            <a:ext cx="0" cy="1427998"/>
+            <a:off x="6637036" y="3223027"/>
+            <a:ext cx="0" cy="1770701"/>
           </a:xfrm>
           <a:prstGeom prst="line">
             <a:avLst/>
           </a:prstGeom>
           <a:ln>
             <a:solidFill>
-              <a:schemeClr val="tx1"/>
+              <a:schemeClr val="accent6">
+                <a:lumMod val="75000"/>
+              </a:schemeClr>
             </a:solidFill>
             <a:prstDash val="sysDash"/>
             <a:headEnd/>
             <a:tailEnd/>
           </a:ln>
+          <a:effectLst/>
         </p:spPr>
         <p:style>
           <a:lnRef idx="2">
@@ -3625,7 +3644,7 @@
           <a:noFill/>
           <a:ln w="19050">
             <a:solidFill>
-              <a:schemeClr val="tx1"/>
+              <a:srgbClr val="C00000"/>
             </a:solidFill>
             <a:round/>
             <a:headEnd/>
@@ -3654,7 +3673,17 @@
           <a:prstGeom prst="rect">
             <a:avLst/>
           </a:prstGeom>
-          <a:ln/>
+          <a:solidFill>
+            <a:schemeClr val="accent6">
+              <a:lumMod val="75000"/>
+            </a:schemeClr>
+          </a:solidFill>
+          <a:ln>
+            <a:solidFill>
+              <a:schemeClr val="bg1"/>
+            </a:solidFill>
+          </a:ln>
+          <a:effectLst/>
         </p:spPr>
         <p:style>
           <a:lnRef idx="1">
@@ -3677,7 +3706,7 @@
             <a:pPr algn="ctr"/>
             <a:endParaRPr lang="en-US" sz="2000">
               <a:solidFill>
-                <a:schemeClr val="tx1"/>
+                <a:schemeClr val="bg1"/>
               </a:solidFill>
             </a:endParaRPr>
           </a:p>
@@ -3702,7 +3731,9 @@
           <a:noFill/>
           <a:ln w="19050">
             <a:solidFill>
-              <a:schemeClr val="tx1"/>
+              <a:schemeClr val="accent6">
+                <a:lumMod val="75000"/>
+              </a:schemeClr>
             </a:solidFill>
             <a:prstDash val="sysDash"/>
             <a:round/>
@@ -3737,7 +3768,7 @@
           <a:noFill/>
           <a:ln w="19050">
             <a:solidFill>
-              <a:schemeClr val="tx1"/>
+              <a:srgbClr val="C00000"/>
             </a:solidFill>
             <a:round/>
             <a:headEnd/>
@@ -3816,7 +3847,7 @@
           <a:noFill/>
           <a:ln w="19050">
             <a:solidFill>
-              <a:schemeClr val="tx1"/>
+              <a:srgbClr val="00B050"/>
             </a:solidFill>
             <a:prstDash val="sysDash"/>
             <a:round/>
@@ -3840,7 +3871,7 @@
         </p:nvSpPr>
         <p:spPr>
           <a:xfrm flipV="1">
-            <a:off x="1778370" y="2643116"/>
+            <a:off x="1475656" y="2643116"/>
             <a:ext cx="673143" cy="403761"/>
           </a:xfrm>
           <a:prstGeom prst="snip1Rect">
@@ -3854,7 +3885,7 @@
           </a:solidFill>
           <a:ln w="19050">
             <a:solidFill>
-              <a:schemeClr val="tx1"/>
+              <a:srgbClr val="0070C0"/>
             </a:solidFill>
           </a:ln>
         </p:spPr>
@@ -3895,7 +3926,7 @@
         </p:nvSpPr>
         <p:spPr bwMode="auto">
           <a:xfrm>
-            <a:off x="1822926" y="2600871"/>
+            <a:off x="1520212" y="2600871"/>
             <a:ext cx="3016332" cy="381000"/>
           </a:xfrm>
           <a:prstGeom prst="rect">
@@ -4053,7 +4084,7 @@
             <a:r>
               <a:rPr lang="en-US" sz="2000" dirty="0">
                 <a:solidFill>
-                  <a:schemeClr val="tx1"/>
+                  <a:srgbClr val="0070C0"/>
                 </a:solidFill>
                 <a:cs typeface="Arial" charset="0"/>
               </a:rPr>
@@ -4062,24 +4093,15 @@
             <a:r>
               <a:rPr lang="en-US" sz="2000" dirty="0" smtClean="0">
                 <a:solidFill>
-                  <a:schemeClr val="tx1"/>
+                  <a:srgbClr val="0070C0"/>
                 </a:solidFill>
                 <a:cs typeface="Arial" charset="0"/>
               </a:rPr>
-              <a:t>oop     </a:t>
-            </a:r>
-            <a:r>
-              <a:rPr lang="en-US" sz="2000" dirty="0" smtClean="0">
-                <a:solidFill>
-                  <a:schemeClr val="tx1"/>
-                </a:solidFill>
-                <a:cs typeface="Arial" charset="0"/>
-              </a:rPr>
-              <a:t>[until has room]</a:t>
+              <a:t>oop     [until has room]</a:t>
             </a:r>
             <a:endParaRPr lang="en-US" sz="2000" dirty="0">
               <a:solidFill>
-                <a:schemeClr val="tx1"/>
+                <a:srgbClr val="0070C0"/>
               </a:solidFill>
               <a:cs typeface="Arial" charset="0"/>
             </a:endParaRPr>
@@ -4102,10 +4124,19 @@
           <a:prstGeom prst="rect">
             <a:avLst/>
           </a:prstGeom>
+          <a:solidFill>
+            <a:schemeClr val="accent6">
+              <a:lumMod val="75000"/>
+            </a:schemeClr>
+          </a:solidFill>
           <a:ln>
+            <a:solidFill>
+              <a:schemeClr val="bg1"/>
+            </a:solidFill>
             <a:headEnd/>
             <a:tailEnd/>
           </a:ln>
+          <a:effectLst/>
         </p:spPr>
         <p:style>
           <a:lnRef idx="1">
@@ -4137,14 +4168,14 @@
             <a:r>
               <a:rPr lang="en-US" sz="2000" dirty="0" smtClean="0">
                 <a:solidFill>
-                  <a:schemeClr val="tx1"/>
+                  <a:schemeClr val="bg1"/>
                 </a:solidFill>
               </a:rPr>
               <a:t>p:Person</a:t>
             </a:r>
             <a:endParaRPr lang="en-US" sz="2000" dirty="0">
               <a:solidFill>
-                <a:schemeClr val="tx1"/>
+                <a:schemeClr val="bg1"/>
               </a:solidFill>
             </a:endParaRPr>
           </a:p>
@@ -4164,7 +4195,15 @@
           <a:prstGeom prst="rect">
             <a:avLst/>
           </a:prstGeom>
-          <a:ln/>
+          <a:solidFill>
+            <a:srgbClr val="7030A0"/>
+          </a:solidFill>
+          <a:ln>
+            <a:solidFill>
+              <a:schemeClr val="bg1"/>
+            </a:solidFill>
+          </a:ln>
+          <a:effectLst/>
         </p:spPr>
         <p:style>
           <a:lnRef idx="1">
@@ -4187,7 +4226,7 @@
             <a:pPr algn="ctr"/>
             <a:endParaRPr lang="en-US" sz="2000">
               <a:solidFill>
-                <a:schemeClr val="tx1"/>
+                <a:schemeClr val="bg1"/>
               </a:solidFill>
             </a:endParaRPr>
           </a:p>
@@ -4203,8 +4242,8 @@
         </p:nvSpPr>
         <p:spPr bwMode="auto">
           <a:xfrm flipH="1">
-            <a:off x="1660262" y="2364391"/>
-            <a:ext cx="2590800" cy="0"/>
+            <a:off x="2297786" y="2364391"/>
+            <a:ext cx="1953276" cy="0"/>
           </a:xfrm>
           <a:prstGeom prst="line">
             <a:avLst/>
@@ -4212,7 +4251,7 @@
           <a:noFill/>
           <a:ln w="19050">
             <a:solidFill>
-              <a:schemeClr val="tx1"/>
+              <a:srgbClr val="7030A0"/>
             </a:solidFill>
             <a:prstDash val="sysDash"/>
             <a:round/>
@@ -4239,19 +4278,20 @@
         <p:spPr bwMode="auto">
           <a:xfrm>
             <a:off x="7704110" y="3542961"/>
-            <a:ext cx="0" cy="1108065"/>
+            <a:ext cx="0" cy="1450767"/>
           </a:xfrm>
           <a:prstGeom prst="line">
             <a:avLst/>
           </a:prstGeom>
           <a:ln>
             <a:solidFill>
-              <a:schemeClr val="tx1"/>
+              <a:srgbClr val="00B050"/>
             </a:solidFill>
             <a:prstDash val="sysDash"/>
             <a:headEnd/>
             <a:tailEnd/>
           </a:ln>
+          <a:effectLst/>
         </p:spPr>
         <p:style>
           <a:lnRef idx="2">
@@ -4283,13 +4323,21 @@
         </p:nvSpPr>
         <p:spPr>
           <a:xfrm>
-            <a:off x="7578429" y="3696865"/>
-            <a:ext cx="251361" cy="124116"/>
+            <a:off x="7578429" y="3696864"/>
+            <a:ext cx="251361" cy="149141"/>
           </a:xfrm>
           <a:prstGeom prst="rect">
             <a:avLst/>
           </a:prstGeom>
-          <a:ln/>
+          <a:solidFill>
+            <a:srgbClr val="00B050"/>
+          </a:solidFill>
+          <a:ln>
+            <a:solidFill>
+              <a:schemeClr val="bg1"/>
+            </a:solidFill>
+          </a:ln>
+          <a:effectLst/>
         </p:spPr>
         <p:style>
           <a:lnRef idx="1">
@@ -4312,7 +4360,7 @@
             <a:pPr algn="ctr"/>
             <a:endParaRPr lang="en-US" sz="2000">
               <a:solidFill>
-                <a:schemeClr val="tx1"/>
+                <a:schemeClr val="bg1"/>
               </a:solidFill>
             </a:endParaRPr>
           </a:p>
@@ -4334,10 +4382,17 @@
           <a:prstGeom prst="rect">
             <a:avLst/>
           </a:prstGeom>
+          <a:solidFill>
+            <a:srgbClr val="00B050"/>
+          </a:solidFill>
           <a:ln>
+            <a:solidFill>
+              <a:schemeClr val="bg1"/>
+            </a:solidFill>
             <a:headEnd/>
             <a:tailEnd/>
           </a:ln>
+          <a:effectLst/>
         </p:spPr>
         <p:style>
           <a:lnRef idx="1">
@@ -4369,7 +4424,7 @@
             <a:r>
               <a:rPr lang="en-US" sz="2000" dirty="0">
                 <a:solidFill>
-                  <a:schemeClr val="tx1"/>
+                  <a:schemeClr val="bg1"/>
                 </a:solidFill>
               </a:rPr>
               <a:t>:</a:t>
@@ -4377,14 +4432,14 @@
             <a:r>
               <a:rPr lang="en-US" sz="2000" dirty="0" smtClean="0">
                 <a:solidFill>
-                  <a:schemeClr val="tx1"/>
+                  <a:schemeClr val="bg1"/>
                 </a:solidFill>
               </a:rPr>
               <a:t>Tag</a:t>
             </a:r>
             <a:endParaRPr lang="en-US" sz="2000" dirty="0">
               <a:solidFill>
-                <a:schemeClr val="tx1"/>
+                <a:schemeClr val="bg1"/>
               </a:solidFill>
             </a:endParaRPr>
           </a:p>
@@ -4409,7 +4464,9 @@
           <a:noFill/>
           <a:ln w="19050">
             <a:solidFill>
-              <a:schemeClr val="tx1"/>
+              <a:schemeClr val="accent6">
+                <a:lumMod val="75000"/>
+              </a:schemeClr>
             </a:solidFill>
             <a:round/>
             <a:headEnd/>
@@ -4424,6 +4481,45 @@
           </a:p>
         </p:txBody>
       </p:sp>
+      <p:cxnSp>
+        <p:nvCxnSpPr>
+          <p:cNvPr id="3" name="Straight Connector 2"/>
+          <p:cNvCxnSpPr/>
+          <p:nvPr/>
+        </p:nvCxnSpPr>
+        <p:spPr>
+          <a:xfrm>
+            <a:off x="2297786" y="1678084"/>
+            <a:ext cx="0" cy="3315645"/>
+          </a:xfrm>
+          <a:prstGeom prst="line">
+            <a:avLst/>
+          </a:prstGeom>
+          <a:ln>
+            <a:solidFill>
+              <a:srgbClr val="C00000"/>
+            </a:solidFill>
+            <a:prstDash val="sysDash"/>
+            <a:headEnd/>
+            <a:tailEnd/>
+          </a:ln>
+          <a:effectLst/>
+        </p:spPr>
+        <p:style>
+          <a:lnRef idx="2">
+            <a:schemeClr val="accent4"/>
+          </a:lnRef>
+          <a:fillRef idx="0">
+            <a:schemeClr val="accent4"/>
+          </a:fillRef>
+          <a:effectRef idx="1">
+            <a:schemeClr val="accent4"/>
+          </a:effectRef>
+          <a:fontRef idx="minor">
+            <a:schemeClr val="tx1"/>
+          </a:fontRef>
+        </p:style>
+      </p:cxnSp>
     </p:spTree>
     <p:extLst>
       <p:ext uri="{BB962C8B-B14F-4D97-AF65-F5344CB8AC3E}">

</xml_diff>

<commit_message>
diagrams/modelling: update question diagrams
</commit_message>
<xml_diff>
--- a/diagrams/modelling/modellingBehaviours/sequenceDiagramsBasic/PersonEtc.pptx
+++ b/diagrams/modelling/modellingBehaviours/sequenceDiagramsBasic/PersonEtc.pptx
@@ -304,7 +304,7 @@
           <a:p>
             <a:fld id="{5C63EA63-0159-4067-AC1E-0A923D89E69F}" type="datetimeFigureOut">
               <a:rPr lang="en-SG" smtClean="0"/>
-              <a:t>23/10/2018</a:t>
+              <a:t>6/10/2019</a:t>
             </a:fld>
             <a:endParaRPr lang="en-SG"/>
           </a:p>
@@ -474,7 +474,7 @@
           <a:p>
             <a:fld id="{5C63EA63-0159-4067-AC1E-0A923D89E69F}" type="datetimeFigureOut">
               <a:rPr lang="en-SG" smtClean="0"/>
-              <a:t>23/10/2018</a:t>
+              <a:t>6/10/2019</a:t>
             </a:fld>
             <a:endParaRPr lang="en-SG"/>
           </a:p>
@@ -654,7 +654,7 @@
           <a:p>
             <a:fld id="{5C63EA63-0159-4067-AC1E-0A923D89E69F}" type="datetimeFigureOut">
               <a:rPr lang="en-SG" smtClean="0"/>
-              <a:t>23/10/2018</a:t>
+              <a:t>6/10/2019</a:t>
             </a:fld>
             <a:endParaRPr lang="en-SG"/>
           </a:p>
@@ -824,7 +824,7 @@
           <a:p>
             <a:fld id="{5C63EA63-0159-4067-AC1E-0A923D89E69F}" type="datetimeFigureOut">
               <a:rPr lang="en-SG" smtClean="0"/>
-              <a:t>23/10/2018</a:t>
+              <a:t>6/10/2019</a:t>
             </a:fld>
             <a:endParaRPr lang="en-SG"/>
           </a:p>
@@ -1070,7 +1070,7 @@
           <a:p>
             <a:fld id="{5C63EA63-0159-4067-AC1E-0A923D89E69F}" type="datetimeFigureOut">
               <a:rPr lang="en-SG" smtClean="0"/>
-              <a:t>23/10/2018</a:t>
+              <a:t>6/10/2019</a:t>
             </a:fld>
             <a:endParaRPr lang="en-SG"/>
           </a:p>
@@ -1358,7 +1358,7 @@
           <a:p>
             <a:fld id="{5C63EA63-0159-4067-AC1E-0A923D89E69F}" type="datetimeFigureOut">
               <a:rPr lang="en-SG" smtClean="0"/>
-              <a:t>23/10/2018</a:t>
+              <a:t>6/10/2019</a:t>
             </a:fld>
             <a:endParaRPr lang="en-SG"/>
           </a:p>
@@ -1780,7 +1780,7 @@
           <a:p>
             <a:fld id="{5C63EA63-0159-4067-AC1E-0A923D89E69F}" type="datetimeFigureOut">
               <a:rPr lang="en-SG" smtClean="0"/>
-              <a:t>23/10/2018</a:t>
+              <a:t>6/10/2019</a:t>
             </a:fld>
             <a:endParaRPr lang="en-SG"/>
           </a:p>
@@ -1898,7 +1898,7 @@
           <a:p>
             <a:fld id="{5C63EA63-0159-4067-AC1E-0A923D89E69F}" type="datetimeFigureOut">
               <a:rPr lang="en-SG" smtClean="0"/>
-              <a:t>23/10/2018</a:t>
+              <a:t>6/10/2019</a:t>
             </a:fld>
             <a:endParaRPr lang="en-SG"/>
           </a:p>
@@ -1993,7 +1993,7 @@
           <a:p>
             <a:fld id="{5C63EA63-0159-4067-AC1E-0A923D89E69F}" type="datetimeFigureOut">
               <a:rPr lang="en-SG" smtClean="0"/>
-              <a:t>23/10/2018</a:t>
+              <a:t>6/10/2019</a:t>
             </a:fld>
             <a:endParaRPr lang="en-SG"/>
           </a:p>
@@ -2270,7 +2270,7 @@
           <a:p>
             <a:fld id="{5C63EA63-0159-4067-AC1E-0A923D89E69F}" type="datetimeFigureOut">
               <a:rPr lang="en-SG" smtClean="0"/>
-              <a:t>23/10/2018</a:t>
+              <a:t>6/10/2019</a:t>
             </a:fld>
             <a:endParaRPr lang="en-SG"/>
           </a:p>
@@ -2523,7 +2523,7 @@
           <a:p>
             <a:fld id="{5C63EA63-0159-4067-AC1E-0A923D89E69F}" type="datetimeFigureOut">
               <a:rPr lang="en-SG" smtClean="0"/>
-              <a:t>23/10/2018</a:t>
+              <a:t>6/10/2019</a:t>
             </a:fld>
             <a:endParaRPr lang="en-SG"/>
           </a:p>
@@ -2736,7 +2736,7 @@
           <a:p>
             <a:fld id="{5C63EA63-0159-4067-AC1E-0A923D89E69F}" type="datetimeFigureOut">
               <a:rPr lang="en-SG" smtClean="0"/>
-              <a:t>23/10/2018</a:t>
+              <a:t>6/10/2019</a:t>
             </a:fld>
             <a:endParaRPr lang="en-SG"/>
           </a:p>
@@ -3329,85 +3329,6 @@
       </p:sp>
       <p:sp>
         <p:nvSpPr>
-          <p:cNvPr id="6" name="Text Box 11"/>
-          <p:cNvSpPr txBox="1">
-            <a:spLocks noChangeArrowheads="1"/>
-          </p:cNvSpPr>
-          <p:nvPr/>
-        </p:nvSpPr>
-        <p:spPr bwMode="auto">
-          <a:xfrm>
-            <a:off x="3585770" y="1625523"/>
-            <a:ext cx="1567434" cy="307777"/>
-          </a:xfrm>
-          <a:prstGeom prst="rect">
-            <a:avLst/>
-          </a:prstGeom>
-          <a:solidFill>
-            <a:srgbClr val="7030A0"/>
-          </a:solidFill>
-          <a:ln>
-            <a:solidFill>
-              <a:schemeClr val="bg1"/>
-            </a:solidFill>
-            <a:headEnd/>
-            <a:tailEnd/>
-          </a:ln>
-          <a:effectLst/>
-        </p:spPr>
-        <p:style>
-          <a:lnRef idx="1">
-            <a:schemeClr val="accent4"/>
-          </a:lnRef>
-          <a:fillRef idx="2">
-            <a:schemeClr val="accent4"/>
-          </a:fillRef>
-          <a:effectRef idx="1">
-            <a:schemeClr val="accent4"/>
-          </a:effectRef>
-          <a:fontRef idx="minor">
-            <a:schemeClr val="dk1"/>
-          </a:fontRef>
-        </p:style>
-        <p:txBody>
-          <a:bodyPr lIns="0" tIns="0" rIns="0" bIns="0">
-            <a:noAutofit/>
-          </a:bodyPr>
-          <a:lstStyle/>
-          <a:p>
-            <a:pPr algn="ctr">
-              <a:spcBef>
-                <a:spcPct val="50000"/>
-              </a:spcBef>
-              <a:buFont typeface="Wingdings" pitchFamily="2" charset="2"/>
-              <a:buNone/>
-            </a:pPr>
-            <a:r>
-              <a:rPr lang="en-US" sz="2000" dirty="0" smtClean="0">
-                <a:solidFill>
-                  <a:schemeClr val="bg1"/>
-                </a:solidFill>
-              </a:rPr>
-              <a:t>:</a:t>
-            </a:r>
-            <a:r>
-              <a:rPr lang="en-US" sz="2000" dirty="0" err="1" smtClean="0">
-                <a:solidFill>
-                  <a:schemeClr val="bg1"/>
-                </a:solidFill>
-              </a:rPr>
-              <a:t>PersonList</a:t>
-            </a:r>
-            <a:endParaRPr lang="en-US" sz="2000" dirty="0">
-              <a:solidFill>
-                <a:schemeClr val="bg1"/>
-              </a:solidFill>
-            </a:endParaRPr>
-          </a:p>
-        </p:txBody>
-      </p:sp>
-      <p:sp>
-        <p:nvSpPr>
           <p:cNvPr id="7" name="Line 15"/>
           <p:cNvSpPr>
             <a:spLocks noChangeShapeType="1"/>
@@ -3793,7 +3714,7 @@
         </p:nvSpPr>
         <p:spPr bwMode="auto">
           <a:xfrm>
-            <a:off x="4886078" y="3335907"/>
+            <a:off x="5007309" y="3491699"/>
             <a:ext cx="370272" cy="400110"/>
           </a:xfrm>
           <a:prstGeom prst="rect">
@@ -3821,10 +3742,10 @@
               <a:buNone/>
             </a:pPr>
             <a:r>
-              <a:rPr lang="en-US" sz="2000" i="1" dirty="0" smtClean="0"/>
+              <a:rPr lang="en-US" sz="2000" dirty="0" smtClean="0"/>
               <a:t>p</a:t>
             </a:r>
-            <a:endParaRPr lang="en-US" sz="2000" i="1" dirty="0"/>
+            <a:endParaRPr lang="en-US" sz="2000" dirty="0"/>
           </a:p>
         </p:txBody>
       </p:sp>
@@ -4520,6 +4441,565 @@
           </a:fontRef>
         </p:style>
       </p:cxnSp>
+      <p:sp>
+        <p:nvSpPr>
+          <p:cNvPr id="37" name="Line 16"/>
+          <p:cNvSpPr>
+            <a:spLocks noChangeShapeType="1"/>
+          </p:cNvSpPr>
+          <p:nvPr/>
+        </p:nvSpPr>
+        <p:spPr bwMode="auto">
+          <a:xfrm flipH="1">
+            <a:off x="2215661" y="6453336"/>
+            <a:ext cx="1911309" cy="0"/>
+          </a:xfrm>
+          <a:prstGeom prst="line">
+            <a:avLst/>
+          </a:prstGeom>
+          <a:noFill/>
+          <a:ln w="19050">
+            <a:solidFill>
+              <a:srgbClr val="7030A0"/>
+            </a:solidFill>
+            <a:prstDash val="sysDash"/>
+            <a:round/>
+            <a:headEnd/>
+            <a:tailEnd type="triangle" w="lg" len="lg"/>
+          </a:ln>
+        </p:spPr>
+        <p:txBody>
+          <a:bodyPr/>
+          <a:lstStyle/>
+          <a:p>
+            <a:endParaRPr lang="en-US" sz="2000"/>
+          </a:p>
+        </p:txBody>
+      </p:sp>
+      <p:sp>
+        <p:nvSpPr>
+          <p:cNvPr id="39" name="Text Box 25"/>
+          <p:cNvSpPr txBox="1">
+            <a:spLocks noChangeArrowheads="1"/>
+          </p:cNvSpPr>
+          <p:nvPr/>
+        </p:nvSpPr>
+        <p:spPr bwMode="auto">
+          <a:xfrm>
+            <a:off x="2303519" y="5607210"/>
+            <a:ext cx="1663130" cy="400110"/>
+          </a:xfrm>
+          <a:prstGeom prst="rect">
+            <a:avLst/>
+          </a:prstGeom>
+          <a:noFill/>
+          <a:ln w="12700" algn="ctr">
+            <a:noFill/>
+            <a:miter lim="800000"/>
+            <a:headEnd/>
+            <a:tailEnd/>
+          </a:ln>
+        </p:spPr>
+        <p:txBody>
+          <a:bodyPr wrap="square">
+            <a:spAutoFit/>
+          </a:bodyPr>
+          <a:lstStyle/>
+          <a:p>
+            <a:pPr>
+              <a:spcBef>
+                <a:spcPct val="50000"/>
+              </a:spcBef>
+              <a:buFont typeface="Wingdings" pitchFamily="2" charset="2"/>
+              <a:buNone/>
+            </a:pPr>
+            <a:r>
+              <a:rPr lang="en-US" sz="2000" dirty="0" err="1" smtClean="0"/>
+              <a:t>addPerson</a:t>
+            </a:r>
+            <a:r>
+              <a:rPr lang="en-US" sz="2000" dirty="0" smtClean="0"/>
+              <a:t>(p)</a:t>
+            </a:r>
+            <a:endParaRPr lang="en-US" sz="2000" dirty="0"/>
+          </a:p>
+        </p:txBody>
+      </p:sp>
+      <p:sp>
+        <p:nvSpPr>
+          <p:cNvPr id="40" name="Rectangle 39"/>
+          <p:cNvSpPr/>
+          <p:nvPr/>
+        </p:nvSpPr>
+        <p:spPr>
+          <a:xfrm>
+            <a:off x="4090741" y="5661300"/>
+            <a:ext cx="231797" cy="792036"/>
+          </a:xfrm>
+          <a:prstGeom prst="rect">
+            <a:avLst/>
+          </a:prstGeom>
+          <a:solidFill>
+            <a:srgbClr val="7030A0"/>
+          </a:solidFill>
+          <a:ln>
+            <a:solidFill>
+              <a:schemeClr val="bg1"/>
+            </a:solidFill>
+          </a:ln>
+          <a:effectLst/>
+        </p:spPr>
+        <p:style>
+          <a:lnRef idx="1">
+            <a:schemeClr val="accent4"/>
+          </a:lnRef>
+          <a:fillRef idx="2">
+            <a:schemeClr val="accent4"/>
+          </a:fillRef>
+          <a:effectRef idx="1">
+            <a:schemeClr val="accent4"/>
+          </a:effectRef>
+          <a:fontRef idx="minor">
+            <a:schemeClr val="dk1"/>
+          </a:fontRef>
+        </p:style>
+        <p:txBody>
+          <a:bodyPr rtlCol="0" anchor="ctr"/>
+          <a:lstStyle/>
+          <a:p>
+            <a:pPr algn="ctr"/>
+            <a:endParaRPr lang="en-US" sz="2000">
+              <a:solidFill>
+                <a:schemeClr val="bg1"/>
+              </a:solidFill>
+            </a:endParaRPr>
+          </a:p>
+        </p:txBody>
+      </p:sp>
+      <p:sp>
+        <p:nvSpPr>
+          <p:cNvPr id="41" name="Line 15"/>
+          <p:cNvSpPr>
+            <a:spLocks noChangeShapeType="1"/>
+          </p:cNvSpPr>
+          <p:nvPr/>
+        </p:nvSpPr>
+        <p:spPr bwMode="auto">
+          <a:xfrm>
+            <a:off x="2179430" y="5676189"/>
+            <a:ext cx="1911309" cy="0"/>
+          </a:xfrm>
+          <a:prstGeom prst="line">
+            <a:avLst/>
+          </a:prstGeom>
+          <a:noFill/>
+          <a:ln w="19050">
+            <a:solidFill>
+              <a:srgbClr val="C00000"/>
+            </a:solidFill>
+            <a:round/>
+            <a:headEnd/>
+            <a:tailEnd type="triangle" w="lg" len="lg"/>
+          </a:ln>
+        </p:spPr>
+        <p:txBody>
+          <a:bodyPr/>
+          <a:lstStyle/>
+          <a:p>
+            <a:endParaRPr lang="en-US" sz="2000"/>
+          </a:p>
+        </p:txBody>
+      </p:sp>
+      <p:sp>
+        <p:nvSpPr>
+          <p:cNvPr id="42" name="Rectangle 41"/>
+          <p:cNvSpPr/>
+          <p:nvPr/>
+        </p:nvSpPr>
+        <p:spPr>
+          <a:xfrm>
+            <a:off x="4243141" y="5813700"/>
+            <a:ext cx="231797" cy="423612"/>
+          </a:xfrm>
+          <a:prstGeom prst="rect">
+            <a:avLst/>
+          </a:prstGeom>
+          <a:solidFill>
+            <a:srgbClr val="7030A0"/>
+          </a:solidFill>
+          <a:ln>
+            <a:solidFill>
+              <a:schemeClr val="bg1"/>
+            </a:solidFill>
+          </a:ln>
+          <a:effectLst/>
+        </p:spPr>
+        <p:style>
+          <a:lnRef idx="1">
+            <a:schemeClr val="accent4"/>
+          </a:lnRef>
+          <a:fillRef idx="2">
+            <a:schemeClr val="accent4"/>
+          </a:fillRef>
+          <a:effectRef idx="1">
+            <a:schemeClr val="accent4"/>
+          </a:effectRef>
+          <a:fontRef idx="minor">
+            <a:schemeClr val="dk1"/>
+          </a:fontRef>
+        </p:style>
+        <p:txBody>
+          <a:bodyPr rtlCol="0" anchor="ctr"/>
+          <a:lstStyle/>
+          <a:p>
+            <a:pPr algn="ctr"/>
+            <a:endParaRPr lang="en-US" sz="2000">
+              <a:solidFill>
+                <a:schemeClr val="bg1"/>
+              </a:solidFill>
+            </a:endParaRPr>
+          </a:p>
+        </p:txBody>
+      </p:sp>
+      <p:sp>
+        <p:nvSpPr>
+          <p:cNvPr id="2" name="Freeform 1"/>
+          <p:cNvSpPr/>
+          <p:nvPr/>
+        </p:nvSpPr>
+        <p:spPr>
+          <a:xfrm>
+            <a:off x="4324865" y="5706288"/>
+            <a:ext cx="244772" cy="134339"/>
+          </a:xfrm>
+          <a:custGeom>
+            <a:avLst/>
+            <a:gdLst>
+              <a:gd name="connsiteX0" fmla="*/ 0 w 244772"/>
+              <a:gd name="connsiteY0" fmla="*/ 60198 h 134339"/>
+              <a:gd name="connsiteX1" fmla="*/ 238897 w 244772"/>
+              <a:gd name="connsiteY1" fmla="*/ 2534 h 134339"/>
+              <a:gd name="connsiteX2" fmla="*/ 148281 w 244772"/>
+              <a:gd name="connsiteY2" fmla="*/ 134339 h 134339"/>
+            </a:gdLst>
+            <a:ahLst/>
+            <a:cxnLst>
+              <a:cxn ang="0">
+                <a:pos x="connsiteX0" y="connsiteY0"/>
+              </a:cxn>
+              <a:cxn ang="0">
+                <a:pos x="connsiteX1" y="connsiteY1"/>
+              </a:cxn>
+              <a:cxn ang="0">
+                <a:pos x="connsiteX2" y="connsiteY2"/>
+              </a:cxn>
+            </a:cxnLst>
+            <a:rect l="l" t="t" r="r" b="b"/>
+            <a:pathLst>
+              <a:path w="244772" h="134339">
+                <a:moveTo>
+                  <a:pt x="0" y="60198"/>
+                </a:moveTo>
+                <a:cubicBezTo>
+                  <a:pt x="107092" y="25187"/>
+                  <a:pt x="214184" y="-9823"/>
+                  <a:pt x="238897" y="2534"/>
+                </a:cubicBezTo>
+                <a:cubicBezTo>
+                  <a:pt x="263611" y="14891"/>
+                  <a:pt x="205946" y="74615"/>
+                  <a:pt x="148281" y="134339"/>
+                </a:cubicBezTo>
+              </a:path>
+            </a:pathLst>
+          </a:custGeom>
+          <a:noFill/>
+          <a:ln w="19050">
+            <a:solidFill>
+              <a:srgbClr val="7030A0"/>
+            </a:solidFill>
+            <a:round/>
+            <a:headEnd/>
+            <a:tailEnd type="triangle" w="lg" len="lg"/>
+          </a:ln>
+        </p:spPr>
+        <p:txBody>
+          <a:bodyPr/>
+          <a:lstStyle/>
+          <a:p>
+            <a:endParaRPr lang="en-US" sz="2000">
+              <a:solidFill>
+                <a:schemeClr val="tx1"/>
+              </a:solidFill>
+            </a:endParaRPr>
+          </a:p>
+        </p:txBody>
+      </p:sp>
+      <p:sp>
+        <p:nvSpPr>
+          <p:cNvPr id="43" name="Text Box 25"/>
+          <p:cNvSpPr txBox="1">
+            <a:spLocks noChangeArrowheads="1"/>
+          </p:cNvSpPr>
+          <p:nvPr/>
+        </p:nvSpPr>
+        <p:spPr bwMode="auto">
+          <a:xfrm>
+            <a:off x="4544007" y="5418310"/>
+            <a:ext cx="1663130" cy="400110"/>
+          </a:xfrm>
+          <a:prstGeom prst="rect">
+            <a:avLst/>
+          </a:prstGeom>
+          <a:noFill/>
+          <a:ln w="12700" algn="ctr">
+            <a:noFill/>
+            <a:miter lim="800000"/>
+            <a:headEnd/>
+            <a:tailEnd/>
+          </a:ln>
+        </p:spPr>
+        <p:txBody>
+          <a:bodyPr wrap="square">
+            <a:spAutoFit/>
+          </a:bodyPr>
+          <a:lstStyle/>
+          <a:p>
+            <a:pPr>
+              <a:spcBef>
+                <a:spcPct val="50000"/>
+              </a:spcBef>
+              <a:buFont typeface="Wingdings" pitchFamily="2" charset="2"/>
+              <a:buNone/>
+            </a:pPr>
+            <a:r>
+              <a:rPr lang="en-US" sz="2000" dirty="0" smtClean="0"/>
+              <a:t>add(p</a:t>
+            </a:r>
+            <a:r>
+              <a:rPr lang="en-US" sz="2000" dirty="0" smtClean="0"/>
+              <a:t>)</a:t>
+            </a:r>
+            <a:endParaRPr lang="en-US" sz="2000" dirty="0"/>
+          </a:p>
+        </p:txBody>
+      </p:sp>
+      <p:sp>
+        <p:nvSpPr>
+          <p:cNvPr id="4" name="Freeform 3"/>
+          <p:cNvSpPr/>
+          <p:nvPr/>
+        </p:nvSpPr>
+        <p:spPr>
+          <a:xfrm>
+            <a:off x="4341341" y="6227805"/>
+            <a:ext cx="228093" cy="107356"/>
+          </a:xfrm>
+          <a:custGeom>
+            <a:avLst/>
+            <a:gdLst>
+              <a:gd name="connsiteX0" fmla="*/ 140043 w 228093"/>
+              <a:gd name="connsiteY0" fmla="*/ 0 h 107356"/>
+              <a:gd name="connsiteX1" fmla="*/ 222421 w 228093"/>
+              <a:gd name="connsiteY1" fmla="*/ 90617 h 107356"/>
+              <a:gd name="connsiteX2" fmla="*/ 0 w 228093"/>
+              <a:gd name="connsiteY2" fmla="*/ 107092 h 107356"/>
+            </a:gdLst>
+            <a:ahLst/>
+            <a:cxnLst>
+              <a:cxn ang="0">
+                <a:pos x="connsiteX0" y="connsiteY0"/>
+              </a:cxn>
+              <a:cxn ang="0">
+                <a:pos x="connsiteX1" y="connsiteY1"/>
+              </a:cxn>
+              <a:cxn ang="0">
+                <a:pos x="connsiteX2" y="connsiteY2"/>
+              </a:cxn>
+            </a:cxnLst>
+            <a:rect l="l" t="t" r="r" b="b"/>
+            <a:pathLst>
+              <a:path w="228093" h="107356">
+                <a:moveTo>
+                  <a:pt x="140043" y="0"/>
+                </a:moveTo>
+                <a:cubicBezTo>
+                  <a:pt x="192902" y="36384"/>
+                  <a:pt x="245761" y="72768"/>
+                  <a:pt x="222421" y="90617"/>
+                </a:cubicBezTo>
+                <a:cubicBezTo>
+                  <a:pt x="199081" y="108466"/>
+                  <a:pt x="99540" y="107779"/>
+                  <a:pt x="0" y="107092"/>
+                </a:cubicBezTo>
+              </a:path>
+            </a:pathLst>
+          </a:custGeom>
+          <a:noFill/>
+          <a:ln w="19050">
+            <a:solidFill>
+              <a:srgbClr val="7030A0"/>
+            </a:solidFill>
+            <a:prstDash val="sysDash"/>
+            <a:round/>
+            <a:headEnd/>
+            <a:tailEnd type="triangle" w="lg" len="lg"/>
+          </a:ln>
+        </p:spPr>
+        <p:txBody>
+          <a:bodyPr/>
+          <a:lstStyle/>
+          <a:p>
+            <a:endParaRPr lang="en-US" sz="2000">
+              <a:solidFill>
+                <a:schemeClr val="tx1"/>
+              </a:solidFill>
+            </a:endParaRPr>
+          </a:p>
+        </p:txBody>
+      </p:sp>
+      <p:sp>
+        <p:nvSpPr>
+          <p:cNvPr id="6" name="Text Box 11"/>
+          <p:cNvSpPr txBox="1">
+            <a:spLocks noChangeArrowheads="1"/>
+          </p:cNvSpPr>
+          <p:nvPr/>
+        </p:nvSpPr>
+        <p:spPr bwMode="auto">
+          <a:xfrm>
+            <a:off x="3585770" y="1625523"/>
+            <a:ext cx="1567434" cy="307777"/>
+          </a:xfrm>
+          <a:prstGeom prst="rect">
+            <a:avLst/>
+          </a:prstGeom>
+          <a:solidFill>
+            <a:srgbClr val="7030A0"/>
+          </a:solidFill>
+          <a:ln>
+            <a:solidFill>
+              <a:schemeClr val="bg1"/>
+            </a:solidFill>
+            <a:headEnd/>
+            <a:tailEnd/>
+          </a:ln>
+          <a:effectLst/>
+        </p:spPr>
+        <p:style>
+          <a:lnRef idx="1">
+            <a:schemeClr val="accent4"/>
+          </a:lnRef>
+          <a:fillRef idx="2">
+            <a:schemeClr val="accent4"/>
+          </a:fillRef>
+          <a:effectRef idx="1">
+            <a:schemeClr val="accent4"/>
+          </a:effectRef>
+          <a:fontRef idx="minor">
+            <a:schemeClr val="dk1"/>
+          </a:fontRef>
+        </p:style>
+        <p:txBody>
+          <a:bodyPr lIns="0" tIns="0" rIns="0" bIns="0">
+            <a:noAutofit/>
+          </a:bodyPr>
+          <a:lstStyle/>
+          <a:p>
+            <a:pPr algn="ctr">
+              <a:spcBef>
+                <a:spcPct val="50000"/>
+              </a:spcBef>
+              <a:buFont typeface="Wingdings" pitchFamily="2" charset="2"/>
+              <a:buNone/>
+            </a:pPr>
+            <a:r>
+              <a:rPr lang="en-US" sz="2000" dirty="0" smtClean="0">
+                <a:solidFill>
+                  <a:schemeClr val="bg1"/>
+                </a:solidFill>
+              </a:rPr>
+              <a:t>:</a:t>
+            </a:r>
+            <a:r>
+              <a:rPr lang="en-US" sz="2000" dirty="0" err="1" smtClean="0">
+                <a:solidFill>
+                  <a:schemeClr val="bg1"/>
+                </a:solidFill>
+              </a:rPr>
+              <a:t>PersonList</a:t>
+            </a:r>
+            <a:endParaRPr lang="en-US" sz="2000" dirty="0">
+              <a:solidFill>
+                <a:schemeClr val="bg1"/>
+              </a:solidFill>
+            </a:endParaRPr>
+          </a:p>
+        </p:txBody>
+      </p:sp>
+      <p:sp>
+        <p:nvSpPr>
+          <p:cNvPr id="9" name="Rounded Rectangular Callout 8"/>
+          <p:cNvSpPr/>
+          <p:nvPr/>
+        </p:nvSpPr>
+        <p:spPr>
+          <a:xfrm>
+            <a:off x="560599" y="1501681"/>
+            <a:ext cx="1152128" cy="481332"/>
+          </a:xfrm>
+          <a:prstGeom prst="wedgeRoundRectCallout">
+            <a:avLst>
+              <a:gd name="adj1" fmla="val 97089"/>
+              <a:gd name="adj2" fmla="val 57366"/>
+              <a:gd name="adj3" fmla="val 16667"/>
+            </a:avLst>
+          </a:prstGeom>
+          <a:solidFill>
+            <a:srgbClr val="FFFF00"/>
+          </a:solidFill>
+          <a:ln>
+            <a:noFill/>
+          </a:ln>
+        </p:spPr>
+        <p:style>
+          <a:lnRef idx="2">
+            <a:schemeClr val="accent1">
+              <a:shade val="50000"/>
+            </a:schemeClr>
+          </a:lnRef>
+          <a:fillRef idx="1">
+            <a:schemeClr val="accent1"/>
+          </a:fillRef>
+          <a:effectRef idx="0">
+            <a:schemeClr val="accent1"/>
+          </a:effectRef>
+          <a:fontRef idx="minor">
+            <a:schemeClr val="lt1"/>
+          </a:fontRef>
+        </p:style>
+        <p:txBody>
+          <a:bodyPr rtlCol="0" anchor="ctr"/>
+          <a:lstStyle/>
+          <a:p>
+            <a:pPr algn="ctr"/>
+            <a:r>
+              <a:rPr lang="en-US" dirty="0" smtClean="0">
+                <a:solidFill>
+                  <a:schemeClr val="tx1"/>
+                </a:solidFill>
+              </a:rPr>
+              <a:t>optional</a:t>
+            </a:r>
+            <a:endParaRPr lang="en-US" dirty="0">
+              <a:solidFill>
+                <a:schemeClr val="tx1"/>
+              </a:solidFill>
+            </a:endParaRPr>
+          </a:p>
+        </p:txBody>
+      </p:sp>
     </p:spTree>
     <p:extLst>
       <p:ext uri="{BB962C8B-B14F-4D97-AF65-F5344CB8AC3E}">
@@ -5357,6 +5837,213 @@
                       </p:childTnLst>
                     </p:cTn>
                   </p:par>
+                  <p:par>
+                    <p:cTn id="65" fill="hold">
+                      <p:stCondLst>
+                        <p:cond delay="indefinite"/>
+                      </p:stCondLst>
+                      <p:childTnLst>
+                        <p:par>
+                          <p:cTn id="66" fill="hold">
+                            <p:stCondLst>
+                              <p:cond delay="0"/>
+                            </p:stCondLst>
+                            <p:childTnLst>
+                              <p:par>
+                                <p:cTn id="67" presetID="1" presetClass="entr" presetSubtype="0" fill="hold" grpId="0" nodeType="clickEffect">
+                                  <p:stCondLst>
+                                    <p:cond delay="0"/>
+                                  </p:stCondLst>
+                                  <p:childTnLst>
+                                    <p:set>
+                                      <p:cBhvr>
+                                        <p:cTn id="68" dur="1" fill="hold">
+                                          <p:stCondLst>
+                                            <p:cond delay="0"/>
+                                          </p:stCondLst>
+                                        </p:cTn>
+                                        <p:tgtEl>
+                                          <p:spTgt spid="41"/>
+                                        </p:tgtEl>
+                                        <p:attrNameLst>
+                                          <p:attrName>style.visibility</p:attrName>
+                                        </p:attrNameLst>
+                                      </p:cBhvr>
+                                      <p:to>
+                                        <p:strVal val="visible"/>
+                                      </p:to>
+                                    </p:set>
+                                  </p:childTnLst>
+                                </p:cTn>
+                              </p:par>
+                              <p:par>
+                                <p:cTn id="69" presetID="1" presetClass="exit" presetSubtype="0" fill="hold" grpId="0" nodeType="withEffect">
+                                  <p:stCondLst>
+                                    <p:cond delay="0"/>
+                                  </p:stCondLst>
+                                  <p:childTnLst>
+                                    <p:set>
+                                      <p:cBhvr>
+                                        <p:cTn id="70" dur="1" fill="hold">
+                                          <p:stCondLst>
+                                            <p:cond delay="0"/>
+                                          </p:stCondLst>
+                                        </p:cTn>
+                                        <p:tgtEl>
+                                          <p:spTgt spid="37"/>
+                                        </p:tgtEl>
+                                        <p:attrNameLst>
+                                          <p:attrName>style.visibility</p:attrName>
+                                        </p:attrNameLst>
+                                      </p:cBhvr>
+                                      <p:to>
+                                        <p:strVal val="hidden"/>
+                                      </p:to>
+                                    </p:set>
+                                  </p:childTnLst>
+                                </p:cTn>
+                              </p:par>
+                              <p:par>
+                                <p:cTn id="71" presetID="1" presetClass="exit" presetSubtype="0" fill="hold" grpId="0" nodeType="withEffect">
+                                  <p:stCondLst>
+                                    <p:cond delay="0"/>
+                                  </p:stCondLst>
+                                  <p:childTnLst>
+                                    <p:set>
+                                      <p:cBhvr>
+                                        <p:cTn id="72" dur="1" fill="hold">
+                                          <p:stCondLst>
+                                            <p:cond delay="0"/>
+                                          </p:stCondLst>
+                                        </p:cTn>
+                                        <p:tgtEl>
+                                          <p:spTgt spid="39"/>
+                                        </p:tgtEl>
+                                        <p:attrNameLst>
+                                          <p:attrName>style.visibility</p:attrName>
+                                        </p:attrNameLst>
+                                      </p:cBhvr>
+                                      <p:to>
+                                        <p:strVal val="hidden"/>
+                                      </p:to>
+                                    </p:set>
+                                  </p:childTnLst>
+                                </p:cTn>
+                              </p:par>
+                              <p:par>
+                                <p:cTn id="73" presetID="1" presetClass="exit" presetSubtype="0" fill="hold" grpId="0" nodeType="withEffect">
+                                  <p:stCondLst>
+                                    <p:cond delay="0"/>
+                                  </p:stCondLst>
+                                  <p:childTnLst>
+                                    <p:set>
+                                      <p:cBhvr>
+                                        <p:cTn id="74" dur="1" fill="hold">
+                                          <p:stCondLst>
+                                            <p:cond delay="0"/>
+                                          </p:stCondLst>
+                                        </p:cTn>
+                                        <p:tgtEl>
+                                          <p:spTgt spid="40"/>
+                                        </p:tgtEl>
+                                        <p:attrNameLst>
+                                          <p:attrName>style.visibility</p:attrName>
+                                        </p:attrNameLst>
+                                      </p:cBhvr>
+                                      <p:to>
+                                        <p:strVal val="hidden"/>
+                                      </p:to>
+                                    </p:set>
+                                  </p:childTnLst>
+                                </p:cTn>
+                              </p:par>
+                              <p:par>
+                                <p:cTn id="75" presetID="1" presetClass="exit" presetSubtype="0" fill="hold" grpId="1" nodeType="withEffect">
+                                  <p:stCondLst>
+                                    <p:cond delay="0"/>
+                                  </p:stCondLst>
+                                  <p:childTnLst>
+                                    <p:set>
+                                      <p:cBhvr>
+                                        <p:cTn id="76" dur="1" fill="hold">
+                                          <p:stCondLst>
+                                            <p:cond delay="0"/>
+                                          </p:stCondLst>
+                                        </p:cTn>
+                                        <p:tgtEl>
+                                          <p:spTgt spid="41"/>
+                                        </p:tgtEl>
+                                        <p:attrNameLst>
+                                          <p:attrName>style.visibility</p:attrName>
+                                        </p:attrNameLst>
+                                      </p:cBhvr>
+                                      <p:to>
+                                        <p:strVal val="hidden"/>
+                                      </p:to>
+                                    </p:set>
+                                  </p:childTnLst>
+                                </p:cTn>
+                              </p:par>
+                              <p:par>
+                                <p:cTn id="77" presetID="1" presetClass="exit" presetSubtype="0" fill="hold" grpId="0" nodeType="withEffect">
+                                  <p:stCondLst>
+                                    <p:cond delay="0"/>
+                                  </p:stCondLst>
+                                  <p:childTnLst>
+                                    <p:set>
+                                      <p:cBhvr>
+                                        <p:cTn id="78" dur="1" fill="hold">
+                                          <p:stCondLst>
+                                            <p:cond delay="0"/>
+                                          </p:stCondLst>
+                                        </p:cTn>
+                                        <p:tgtEl>
+                                          <p:spTgt spid="42"/>
+                                        </p:tgtEl>
+                                        <p:attrNameLst>
+                                          <p:attrName>style.visibility</p:attrName>
+                                        </p:attrNameLst>
+                                      </p:cBhvr>
+                                      <p:to>
+                                        <p:strVal val="hidden"/>
+                                      </p:to>
+                                    </p:set>
+                                  </p:childTnLst>
+                                </p:cTn>
+                              </p:par>
+                              <p:par>
+                                <p:cTn id="79" presetID="1" presetClass="exit" presetSubtype="0" fill="hold" grpId="0" nodeType="withEffect">
+                                  <p:stCondLst>
+                                    <p:cond delay="0"/>
+                                  </p:stCondLst>
+                                  <p:childTnLst>
+                                    <p:set>
+                                      <p:cBhvr>
+                                        <p:cTn id="80" dur="1" fill="hold">
+                                          <p:stCondLst>
+                                            <p:cond delay="0"/>
+                                          </p:stCondLst>
+                                        </p:cTn>
+                                        <p:tgtEl>
+                                          <p:spTgt spid="43"/>
+                                        </p:tgtEl>
+                                        <p:attrNameLst>
+                                          <p:attrName>style.visibility</p:attrName>
+                                        </p:attrNameLst>
+                                      </p:cBhvr>
+                                      <p:to>
+                                        <p:strVal val="hidden"/>
+                                      </p:to>
+                                    </p:set>
+                                  </p:childTnLst>
+                                </p:cTn>
+                              </p:par>
+                            </p:childTnLst>
+                          </p:cTn>
+                        </p:par>
+                      </p:childTnLst>
+                    </p:cTn>
+                  </p:par>
                 </p:childTnLst>
               </p:cTn>
               <p:prevCondLst>
@@ -5382,7 +6069,6 @@
       <p:bldP spid="34" grpId="0" animBg="1"/>
       <p:bldP spid="34" grpId="1" animBg="1"/>
       <p:bldP spid="5" grpId="0" animBg="1"/>
-      <p:bldP spid="6" grpId="0" animBg="1"/>
       <p:bldP spid="7" grpId="0" animBg="1"/>
       <p:bldP spid="8" grpId="0" animBg="1"/>
       <p:bldP spid="10" grpId="0"/>
@@ -5408,6 +6094,14 @@
       <p:bldP spid="31" grpId="0" animBg="1"/>
       <p:bldP spid="32" grpId="0" animBg="1"/>
       <p:bldP spid="33" grpId="0" animBg="1"/>
+      <p:bldP spid="37" grpId="0" animBg="1"/>
+      <p:bldP spid="39" grpId="0"/>
+      <p:bldP spid="40" grpId="0" animBg="1"/>
+      <p:bldP spid="41" grpId="0" animBg="1"/>
+      <p:bldP spid="41" grpId="1" animBg="1"/>
+      <p:bldP spid="42" grpId="0" animBg="1"/>
+      <p:bldP spid="43" grpId="0"/>
+      <p:bldP spid="6" grpId="0" animBg="1"/>
     </p:bldLst>
   </p:timing>
 </p:sld>

</xml_diff>